<commit_message>
Included treeview into relate
</commit_message>
<xml_diff>
--- a/docs/figures/mutation_rate.pptx
+++ b/docs/figures/mutation_rate.pptx
@@ -104,11 +104,6 @@
       </a:defRPr>
     </a:lvl9pPr>
   </p:defaultTextStyle>
-  <p:extLst>
-    <p:ext uri="{EFAFB233-063F-42B5-8137-9DF3F51BA10A}">
-      <p15:sldGuideLst xmlns:p15="http://schemas.microsoft.com/office/powerpoint/2012/main"/>
-    </p:ext>
-  </p:extLst>
 </p:presentation>
 </file>
 
@@ -243,7 +238,7 @@
           <a:p>
             <a:fld id="{295B88CC-69B2-5741-AAEF-1B872AC543D3}" type="datetimeFigureOut">
               <a:rPr lang="en-US" smtClean="0"/>
-              <a:t>3/14/18</a:t>
+              <a:t>11/28/17</a:t>
             </a:fld>
             <a:endParaRPr lang="en-US"/>
           </a:p>
@@ -413,7 +408,7 @@
           <a:p>
             <a:fld id="{295B88CC-69B2-5741-AAEF-1B872AC543D3}" type="datetimeFigureOut">
               <a:rPr lang="en-US" smtClean="0"/>
-              <a:t>3/14/18</a:t>
+              <a:t>11/28/17</a:t>
             </a:fld>
             <a:endParaRPr lang="en-US"/>
           </a:p>
@@ -593,7 +588,7 @@
           <a:p>
             <a:fld id="{295B88CC-69B2-5741-AAEF-1B872AC543D3}" type="datetimeFigureOut">
               <a:rPr lang="en-US" smtClean="0"/>
-              <a:t>3/14/18</a:t>
+              <a:t>11/28/17</a:t>
             </a:fld>
             <a:endParaRPr lang="en-US"/>
           </a:p>
@@ -763,7 +758,7 @@
           <a:p>
             <a:fld id="{295B88CC-69B2-5741-AAEF-1B872AC543D3}" type="datetimeFigureOut">
               <a:rPr lang="en-US" smtClean="0"/>
-              <a:t>3/14/18</a:t>
+              <a:t>11/28/17</a:t>
             </a:fld>
             <a:endParaRPr lang="en-US"/>
           </a:p>
@@ -1007,7 +1002,7 @@
           <a:p>
             <a:fld id="{295B88CC-69B2-5741-AAEF-1B872AC543D3}" type="datetimeFigureOut">
               <a:rPr lang="en-US" smtClean="0"/>
-              <a:t>3/14/18</a:t>
+              <a:t>11/28/17</a:t>
             </a:fld>
             <a:endParaRPr lang="en-US"/>
           </a:p>
@@ -1239,7 +1234,7 @@
           <a:p>
             <a:fld id="{295B88CC-69B2-5741-AAEF-1B872AC543D3}" type="datetimeFigureOut">
               <a:rPr lang="en-US" smtClean="0"/>
-              <a:t>3/14/18</a:t>
+              <a:t>11/28/17</a:t>
             </a:fld>
             <a:endParaRPr lang="en-US"/>
           </a:p>
@@ -1606,7 +1601,7 @@
           <a:p>
             <a:fld id="{295B88CC-69B2-5741-AAEF-1B872AC543D3}" type="datetimeFigureOut">
               <a:rPr lang="en-US" smtClean="0"/>
-              <a:t>3/14/18</a:t>
+              <a:t>11/28/17</a:t>
             </a:fld>
             <a:endParaRPr lang="en-US"/>
           </a:p>
@@ -1724,7 +1719,7 @@
           <a:p>
             <a:fld id="{295B88CC-69B2-5741-AAEF-1B872AC543D3}" type="datetimeFigureOut">
               <a:rPr lang="en-US" smtClean="0"/>
-              <a:t>3/14/18</a:t>
+              <a:t>11/28/17</a:t>
             </a:fld>
             <a:endParaRPr lang="en-US"/>
           </a:p>
@@ -1819,7 +1814,7 @@
           <a:p>
             <a:fld id="{295B88CC-69B2-5741-AAEF-1B872AC543D3}" type="datetimeFigureOut">
               <a:rPr lang="en-US" smtClean="0"/>
-              <a:t>3/14/18</a:t>
+              <a:t>11/28/17</a:t>
             </a:fld>
             <a:endParaRPr lang="en-US"/>
           </a:p>
@@ -2096,7 +2091,7 @@
           <a:p>
             <a:fld id="{295B88CC-69B2-5741-AAEF-1B872AC543D3}" type="datetimeFigureOut">
               <a:rPr lang="en-US" smtClean="0"/>
-              <a:t>3/14/18</a:t>
+              <a:t>11/28/17</a:t>
             </a:fld>
             <a:endParaRPr lang="en-US"/>
           </a:p>
@@ -2353,7 +2348,7 @@
           <a:p>
             <a:fld id="{295B88CC-69B2-5741-AAEF-1B872AC543D3}" type="datetimeFigureOut">
               <a:rPr lang="en-US" smtClean="0"/>
-              <a:t>3/14/18</a:t>
+              <a:t>11/28/17</a:t>
             </a:fld>
             <a:endParaRPr lang="en-US"/>
           </a:p>
@@ -2566,7 +2561,7 @@
           <a:p>
             <a:fld id="{295B88CC-69B2-5741-AAEF-1B872AC543D3}" type="datetimeFigureOut">
               <a:rPr lang="en-US" smtClean="0"/>
-              <a:t>3/14/18</a:t>
+              <a:t>11/28/17</a:t>
             </a:fld>
             <a:endParaRPr lang="en-US"/>
           </a:p>
@@ -2973,155 +2968,27 @@
       </p:grpSpPr>
       <p:pic>
         <p:nvPicPr>
-          <p:cNvPr id="2" name="Picture 1"/>
+          <p:cNvPr id="4" name="Picture 3"/>
           <p:cNvPicPr>
             <a:picLocks noChangeAspect="1"/>
           </p:cNvPicPr>
           <p:nvPr/>
         </p:nvPicPr>
         <p:blipFill rotWithShape="1">
-          <a:blip r:embed="rId2">
-            <a:extLst>
-              <a:ext uri="{28A0092B-C50C-407E-A947-70E740481C1C}">
-                <a14:useLocalDpi xmlns:a14="http://schemas.microsoft.com/office/drawing/2010/main" val="0"/>
-              </a:ext>
-            </a:extLst>
-          </a:blip>
-          <a:srcRect l="40615" t="52652" r="30671" b="9230"/>
+          <a:blip r:embed="rId2"/>
+          <a:srcRect t="2609" b="49685"/>
           <a:stretch/>
         </p:blipFill>
         <p:spPr>
           <a:xfrm>
-            <a:off x="2136302" y="1075827"/>
-            <a:ext cx="10055698" cy="8899446"/>
+            <a:off x="0" y="2209957"/>
+            <a:ext cx="12268702" cy="7803837"/>
           </a:xfrm>
           <a:prstGeom prst="rect">
             <a:avLst/>
           </a:prstGeom>
         </p:spPr>
       </p:pic>
-      <p:pic>
-        <p:nvPicPr>
-          <p:cNvPr id="6" name="Picture 5"/>
-          <p:cNvPicPr>
-            <a:picLocks noChangeAspect="1"/>
-          </p:cNvPicPr>
-          <p:nvPr/>
-        </p:nvPicPr>
-        <p:blipFill rotWithShape="1">
-          <a:blip r:embed="rId2">
-            <a:extLst>
-              <a:ext uri="{28A0092B-C50C-407E-A947-70E740481C1C}">
-                <a14:useLocalDpi xmlns:a14="http://schemas.microsoft.com/office/drawing/2010/main" val="0"/>
-              </a:ext>
-            </a:extLst>
-          </a:blip>
-          <a:srcRect l="6890" t="52972" r="88556"/>
-          <a:stretch/>
-        </p:blipFill>
-        <p:spPr>
-          <a:xfrm>
-            <a:off x="692726" y="1176082"/>
-            <a:ext cx="1593273" cy="10968763"/>
-          </a:xfrm>
-          <a:prstGeom prst="rect">
-            <a:avLst/>
-          </a:prstGeom>
-        </p:spPr>
-      </p:pic>
-      <p:pic>
-        <p:nvPicPr>
-          <p:cNvPr id="5" name="Picture 4"/>
-          <p:cNvPicPr>
-            <a:picLocks noChangeAspect="1"/>
-          </p:cNvPicPr>
-          <p:nvPr/>
-        </p:nvPicPr>
-        <p:blipFill rotWithShape="1">
-          <a:blip r:embed="rId2">
-            <a:extLst>
-              <a:ext uri="{28A0092B-C50C-407E-A947-70E740481C1C}">
-                <a14:useLocalDpi xmlns:a14="http://schemas.microsoft.com/office/drawing/2010/main" val="0"/>
-              </a:ext>
-            </a:extLst>
-          </a:blip>
-          <a:srcRect l="26890" t="94161" r="16585" b="625"/>
-          <a:stretch/>
-        </p:blipFill>
-        <p:spPr>
-          <a:xfrm>
-            <a:off x="-7847" y="10993875"/>
-            <a:ext cx="13061100" cy="803109"/>
-          </a:xfrm>
-          <a:prstGeom prst="rect">
-            <a:avLst/>
-          </a:prstGeom>
-        </p:spPr>
-      </p:pic>
-      <p:sp>
-        <p:nvSpPr>
-          <p:cNvPr id="3" name="TextBox 2"/>
-          <p:cNvSpPr txBox="1"/>
-          <p:nvPr/>
-        </p:nvSpPr>
-        <p:spPr>
-          <a:xfrm rot="16200000">
-            <a:off x="-3878886" y="4945988"/>
-            <a:ext cx="8555475" cy="1015663"/>
-          </a:xfrm>
-          <a:prstGeom prst="rect">
-            <a:avLst/>
-          </a:prstGeom>
-          <a:noFill/>
-        </p:spPr>
-        <p:txBody>
-          <a:bodyPr wrap="square" rtlCol="0">
-            <a:spAutoFit/>
-          </a:bodyPr>
-          <a:lstStyle/>
-          <a:p>
-            <a:r>
-              <a:rPr lang="en-US" sz="6000" dirty="0" smtClean="0"/>
-              <a:t>Normalized mutation rate</a:t>
-            </a:r>
-            <a:endParaRPr lang="en-US" sz="6000" dirty="0"/>
-          </a:p>
-        </p:txBody>
-      </p:sp>
-      <p:sp>
-        <p:nvSpPr>
-          <p:cNvPr id="7" name="TextBox 6"/>
-          <p:cNvSpPr txBox="1"/>
-          <p:nvPr/>
-        </p:nvSpPr>
-        <p:spPr>
-          <a:xfrm>
-            <a:off x="5395438" y="9731557"/>
-            <a:ext cx="3537426" cy="1015663"/>
-          </a:xfrm>
-          <a:prstGeom prst="rect">
-            <a:avLst/>
-          </a:prstGeom>
-          <a:noFill/>
-        </p:spPr>
-        <p:txBody>
-          <a:bodyPr wrap="square" rtlCol="0">
-            <a:spAutoFit/>
-          </a:bodyPr>
-          <a:lstStyle/>
-          <a:p>
-            <a:r>
-              <a:rPr lang="en-US" sz="6000"/>
-              <a:t>y</a:t>
-            </a:r>
-            <a:r>
-              <a:rPr lang="en-US" sz="6000" smtClean="0"/>
-              <a:t>ears ago</a:t>
-            </a:r>
-            <a:endParaRPr lang="en-US" sz="6000" dirty="0"/>
-          </a:p>
-        </p:txBody>
-      </p:sp>
     </p:spTree>
     <p:extLst>
       <p:ext uri="{BB962C8B-B14F-4D97-AF65-F5344CB8AC3E}">

</xml_diff>

<commit_message>
Included years_per_gen option for coalescent rates
</commit_message>
<xml_diff>
--- a/docs/figures/mutation_rate.pptx
+++ b/docs/figures/mutation_rate.pptx
@@ -104,6 +104,11 @@
       </a:defRPr>
     </a:lvl9pPr>
   </p:defaultTextStyle>
+  <p:extLst>
+    <p:ext uri="{EFAFB233-063F-42B5-8137-9DF3F51BA10A}">
+      <p15:sldGuideLst xmlns:p15="http://schemas.microsoft.com/office/powerpoint/2012/main"/>
+    </p:ext>
+  </p:extLst>
 </p:presentation>
 </file>
 
@@ -238,7 +243,7 @@
           <a:p>
             <a:fld id="{295B88CC-69B2-5741-AAEF-1B872AC543D3}" type="datetimeFigureOut">
               <a:rPr lang="en-US" smtClean="0"/>
-              <a:t>11/28/17</a:t>
+              <a:t>3/14/18</a:t>
             </a:fld>
             <a:endParaRPr lang="en-US"/>
           </a:p>
@@ -408,7 +413,7 @@
           <a:p>
             <a:fld id="{295B88CC-69B2-5741-AAEF-1B872AC543D3}" type="datetimeFigureOut">
               <a:rPr lang="en-US" smtClean="0"/>
-              <a:t>11/28/17</a:t>
+              <a:t>3/14/18</a:t>
             </a:fld>
             <a:endParaRPr lang="en-US"/>
           </a:p>
@@ -588,7 +593,7 @@
           <a:p>
             <a:fld id="{295B88CC-69B2-5741-AAEF-1B872AC543D3}" type="datetimeFigureOut">
               <a:rPr lang="en-US" smtClean="0"/>
-              <a:t>11/28/17</a:t>
+              <a:t>3/14/18</a:t>
             </a:fld>
             <a:endParaRPr lang="en-US"/>
           </a:p>
@@ -758,7 +763,7 @@
           <a:p>
             <a:fld id="{295B88CC-69B2-5741-AAEF-1B872AC543D3}" type="datetimeFigureOut">
               <a:rPr lang="en-US" smtClean="0"/>
-              <a:t>11/28/17</a:t>
+              <a:t>3/14/18</a:t>
             </a:fld>
             <a:endParaRPr lang="en-US"/>
           </a:p>
@@ -1002,7 +1007,7 @@
           <a:p>
             <a:fld id="{295B88CC-69B2-5741-AAEF-1B872AC543D3}" type="datetimeFigureOut">
               <a:rPr lang="en-US" smtClean="0"/>
-              <a:t>11/28/17</a:t>
+              <a:t>3/14/18</a:t>
             </a:fld>
             <a:endParaRPr lang="en-US"/>
           </a:p>
@@ -1234,7 +1239,7 @@
           <a:p>
             <a:fld id="{295B88CC-69B2-5741-AAEF-1B872AC543D3}" type="datetimeFigureOut">
               <a:rPr lang="en-US" smtClean="0"/>
-              <a:t>11/28/17</a:t>
+              <a:t>3/14/18</a:t>
             </a:fld>
             <a:endParaRPr lang="en-US"/>
           </a:p>
@@ -1601,7 +1606,7 @@
           <a:p>
             <a:fld id="{295B88CC-69B2-5741-AAEF-1B872AC543D3}" type="datetimeFigureOut">
               <a:rPr lang="en-US" smtClean="0"/>
-              <a:t>11/28/17</a:t>
+              <a:t>3/14/18</a:t>
             </a:fld>
             <a:endParaRPr lang="en-US"/>
           </a:p>
@@ -1719,7 +1724,7 @@
           <a:p>
             <a:fld id="{295B88CC-69B2-5741-AAEF-1B872AC543D3}" type="datetimeFigureOut">
               <a:rPr lang="en-US" smtClean="0"/>
-              <a:t>11/28/17</a:t>
+              <a:t>3/14/18</a:t>
             </a:fld>
             <a:endParaRPr lang="en-US"/>
           </a:p>
@@ -1814,7 +1819,7 @@
           <a:p>
             <a:fld id="{295B88CC-69B2-5741-AAEF-1B872AC543D3}" type="datetimeFigureOut">
               <a:rPr lang="en-US" smtClean="0"/>
-              <a:t>11/28/17</a:t>
+              <a:t>3/14/18</a:t>
             </a:fld>
             <a:endParaRPr lang="en-US"/>
           </a:p>
@@ -2091,7 +2096,7 @@
           <a:p>
             <a:fld id="{295B88CC-69B2-5741-AAEF-1B872AC543D3}" type="datetimeFigureOut">
               <a:rPr lang="en-US" smtClean="0"/>
-              <a:t>11/28/17</a:t>
+              <a:t>3/14/18</a:t>
             </a:fld>
             <a:endParaRPr lang="en-US"/>
           </a:p>
@@ -2348,7 +2353,7 @@
           <a:p>
             <a:fld id="{295B88CC-69B2-5741-AAEF-1B872AC543D3}" type="datetimeFigureOut">
               <a:rPr lang="en-US" smtClean="0"/>
-              <a:t>11/28/17</a:t>
+              <a:t>3/14/18</a:t>
             </a:fld>
             <a:endParaRPr lang="en-US"/>
           </a:p>
@@ -2561,7 +2566,7 @@
           <a:p>
             <a:fld id="{295B88CC-69B2-5741-AAEF-1B872AC543D3}" type="datetimeFigureOut">
               <a:rPr lang="en-US" smtClean="0"/>
-              <a:t>11/28/17</a:t>
+              <a:t>3/14/18</a:t>
             </a:fld>
             <a:endParaRPr lang="en-US"/>
           </a:p>
@@ -2968,27 +2973,155 @@
       </p:grpSpPr>
       <p:pic>
         <p:nvPicPr>
-          <p:cNvPr id="4" name="Picture 3"/>
+          <p:cNvPr id="2" name="Picture 1"/>
           <p:cNvPicPr>
             <a:picLocks noChangeAspect="1"/>
           </p:cNvPicPr>
           <p:nvPr/>
         </p:nvPicPr>
         <p:blipFill rotWithShape="1">
-          <a:blip r:embed="rId2"/>
-          <a:srcRect t="2609" b="49685"/>
+          <a:blip r:embed="rId2">
+            <a:extLst>
+              <a:ext uri="{28A0092B-C50C-407E-A947-70E740481C1C}">
+                <a14:useLocalDpi xmlns:a14="http://schemas.microsoft.com/office/drawing/2010/main" val="0"/>
+              </a:ext>
+            </a:extLst>
+          </a:blip>
+          <a:srcRect l="40615" t="52652" r="30671" b="9230"/>
           <a:stretch/>
         </p:blipFill>
         <p:spPr>
           <a:xfrm>
-            <a:off x="0" y="2209957"/>
-            <a:ext cx="12268702" cy="7803837"/>
+            <a:off x="2136302" y="1075827"/>
+            <a:ext cx="10055698" cy="8899446"/>
           </a:xfrm>
           <a:prstGeom prst="rect">
             <a:avLst/>
           </a:prstGeom>
         </p:spPr>
       </p:pic>
+      <p:pic>
+        <p:nvPicPr>
+          <p:cNvPr id="6" name="Picture 5"/>
+          <p:cNvPicPr>
+            <a:picLocks noChangeAspect="1"/>
+          </p:cNvPicPr>
+          <p:nvPr/>
+        </p:nvPicPr>
+        <p:blipFill rotWithShape="1">
+          <a:blip r:embed="rId2">
+            <a:extLst>
+              <a:ext uri="{28A0092B-C50C-407E-A947-70E740481C1C}">
+                <a14:useLocalDpi xmlns:a14="http://schemas.microsoft.com/office/drawing/2010/main" val="0"/>
+              </a:ext>
+            </a:extLst>
+          </a:blip>
+          <a:srcRect l="6890" t="52972" r="88556"/>
+          <a:stretch/>
+        </p:blipFill>
+        <p:spPr>
+          <a:xfrm>
+            <a:off x="692726" y="1176082"/>
+            <a:ext cx="1593273" cy="10968763"/>
+          </a:xfrm>
+          <a:prstGeom prst="rect">
+            <a:avLst/>
+          </a:prstGeom>
+        </p:spPr>
+      </p:pic>
+      <p:pic>
+        <p:nvPicPr>
+          <p:cNvPr id="5" name="Picture 4"/>
+          <p:cNvPicPr>
+            <a:picLocks noChangeAspect="1"/>
+          </p:cNvPicPr>
+          <p:nvPr/>
+        </p:nvPicPr>
+        <p:blipFill rotWithShape="1">
+          <a:blip r:embed="rId2">
+            <a:extLst>
+              <a:ext uri="{28A0092B-C50C-407E-A947-70E740481C1C}">
+                <a14:useLocalDpi xmlns:a14="http://schemas.microsoft.com/office/drawing/2010/main" val="0"/>
+              </a:ext>
+            </a:extLst>
+          </a:blip>
+          <a:srcRect l="26890" t="94161" r="16585" b="625"/>
+          <a:stretch/>
+        </p:blipFill>
+        <p:spPr>
+          <a:xfrm>
+            <a:off x="-7847" y="10993875"/>
+            <a:ext cx="13061100" cy="803109"/>
+          </a:xfrm>
+          <a:prstGeom prst="rect">
+            <a:avLst/>
+          </a:prstGeom>
+        </p:spPr>
+      </p:pic>
+      <p:sp>
+        <p:nvSpPr>
+          <p:cNvPr id="3" name="TextBox 2"/>
+          <p:cNvSpPr txBox="1"/>
+          <p:nvPr/>
+        </p:nvSpPr>
+        <p:spPr>
+          <a:xfrm rot="16200000">
+            <a:off x="-3878886" y="4945988"/>
+            <a:ext cx="8555475" cy="1015663"/>
+          </a:xfrm>
+          <a:prstGeom prst="rect">
+            <a:avLst/>
+          </a:prstGeom>
+          <a:noFill/>
+        </p:spPr>
+        <p:txBody>
+          <a:bodyPr wrap="square" rtlCol="0">
+            <a:spAutoFit/>
+          </a:bodyPr>
+          <a:lstStyle/>
+          <a:p>
+            <a:r>
+              <a:rPr lang="en-US" sz="6000" dirty="0" smtClean="0"/>
+              <a:t>Normalized mutation rate</a:t>
+            </a:r>
+            <a:endParaRPr lang="en-US" sz="6000" dirty="0"/>
+          </a:p>
+        </p:txBody>
+      </p:sp>
+      <p:sp>
+        <p:nvSpPr>
+          <p:cNvPr id="7" name="TextBox 6"/>
+          <p:cNvSpPr txBox="1"/>
+          <p:nvPr/>
+        </p:nvSpPr>
+        <p:spPr>
+          <a:xfrm>
+            <a:off x="5395438" y="9731557"/>
+            <a:ext cx="3537426" cy="1015663"/>
+          </a:xfrm>
+          <a:prstGeom prst="rect">
+            <a:avLst/>
+          </a:prstGeom>
+          <a:noFill/>
+        </p:spPr>
+        <p:txBody>
+          <a:bodyPr wrap="square" rtlCol="0">
+            <a:spAutoFit/>
+          </a:bodyPr>
+          <a:lstStyle/>
+          <a:p>
+            <a:r>
+              <a:rPr lang="en-US" sz="6000"/>
+              <a:t>y</a:t>
+            </a:r>
+            <a:r>
+              <a:rPr lang="en-US" sz="6000" smtClean="0"/>
+              <a:t>ears ago</a:t>
+            </a:r>
+            <a:endParaRPr lang="en-US" sz="6000" dirty="0"/>
+          </a:p>
+        </p:txBody>
+      </p:sp>
     </p:spTree>
     <p:extLst>
       <p:ext uri="{BB962C8B-B14F-4D97-AF65-F5344CB8AC3E}">

</xml_diff>